<commit_message>
Please enter the commit message for your changes. Lines starting with '#' will be ignored, and an empty message aborts the commit.
On branch main
Your branch is ahead of 'origin/main' by 1 commit.
  (use "git push" to publish your local commits)

Changes to be committed:
	modified:   I_HR Presentation.pptx
</commit_message>
<xml_diff>
--- a/I_HR Presentation.pptx
+++ b/I_HR Presentation.pptx
@@ -3238,7 +3238,6 @@
               <a:rPr lang="en-US" sz="2400" dirty="0" smtClean="0"/>
               <a:t>MDTM22</a:t>
             </a:r>
-            <a:endParaRPr lang="en-US" sz="2400" dirty="0" smtClean="0"/>
           </a:p>
         </p:txBody>
       </p:sp>
@@ -3964,7 +3963,7 @@
         <p:spPr/>
         <p:txBody>
           <a:bodyPr>
-            <a:normAutofit fontScale="85000" lnSpcReduction="20000"/>
+            <a:normAutofit fontScale="92500" lnSpcReduction="20000"/>
           </a:bodyPr>
           <a:lstStyle/>
           <a:p>
@@ -3994,8 +3993,18 @@
             </a:pPr>
             <a:r>
               <a:rPr lang="en-US" dirty="0" smtClean="0"/>
-              <a:t>Plotly for interactive visualizations.</a:t>
-            </a:r>
+              <a:t>Plotly for interactive visualizations</a:t>
+            </a:r>
+            <a:r>
+              <a:rPr lang="en-US" dirty="0" smtClean="0"/>
+              <a:t>.</a:t>
+            </a:r>
+          </a:p>
+          <a:p>
+            <a:pPr marL="457200" lvl="1" indent="0">
+              <a:buNone/>
+            </a:pPr>
+            <a:endParaRPr lang="en-US" dirty="0" smtClean="0"/>
           </a:p>
           <a:p>
             <a:pPr marL="0" indent="0">
@@ -4047,65 +4056,10 @@
           <a:p>
             <a:pPr lvl="2"/>
             <a:r>
-              <a:rPr lang="en-US" dirty="0"/>
-              <a:t>C</a:t>
-            </a:r>
-            <a:r>
               <a:rPr lang="en-US" dirty="0" smtClean="0"/>
-              <a:t>lass</a:t>
-            </a:r>
-          </a:p>
-          <a:p>
-            <a:pPr marL="0" indent="0">
-              <a:buNone/>
-            </a:pPr>
-            <a:r>
-              <a:rPr lang="en-US" b="1" dirty="0" smtClean="0">
-                <a:solidFill>
-                  <a:schemeClr val="tx2">
-                    <a:lumMod val="60000"/>
-                    <a:lumOff val="40000"/>
-                  </a:schemeClr>
-                </a:solidFill>
-              </a:rPr>
-              <a:t>Demo Screenshot:</a:t>
-            </a:r>
-            <a:r>
-              <a:rPr lang="en-US" dirty="0" smtClean="0">
-                <a:solidFill>
-                  <a:schemeClr val="tx2">
-                    <a:lumMod val="60000"/>
-                    <a:lumOff val="40000"/>
-                  </a:schemeClr>
-                </a:solidFill>
-              </a:rPr>
-              <a:t> (</a:t>
-            </a:r>
-            <a:r>
-              <a:rPr lang="en-US" i="1" dirty="0" smtClean="0">
-                <a:solidFill>
-                  <a:schemeClr val="tx2">
-                    <a:lumMod val="60000"/>
-                    <a:lumOff val="40000"/>
-                  </a:schemeClr>
-                </a:solidFill>
-              </a:rPr>
-              <a:t>Include a screenshot of the dashboard here.</a:t>
-            </a:r>
-            <a:r>
-              <a:rPr lang="en-US" dirty="0" smtClean="0">
-                <a:solidFill>
-                  <a:schemeClr val="tx2">
-                    <a:lumMod val="60000"/>
-                    <a:lumOff val="40000"/>
-                  </a:schemeClr>
-                </a:solidFill>
-              </a:rPr>
-              <a:t>)</a:t>
-            </a:r>
-          </a:p>
-          <a:p>
-            <a:endParaRPr lang="en-IN" dirty="0"/>
+              <a:t>Class</a:t>
+            </a:r>
+            <a:endParaRPr lang="en-US" dirty="0" smtClean="0"/>
           </a:p>
         </p:txBody>
       </p:sp>
@@ -5104,15 +5058,7 @@
             </a:pPr>
             <a:r>
               <a:rPr lang="en-US" dirty="0" smtClean="0"/>
-              <a:t>Cleaned </a:t>
-            </a:r>
-            <a:r>
-              <a:rPr lang="en-US" dirty="0" err="1" smtClean="0"/>
-              <a:t>backticks</a:t>
-            </a:r>
-            <a:r>
-              <a:rPr lang="en-US" dirty="0" smtClean="0"/>
-              <a:t> (```) in categorical columns.</a:t>
+              <a:t>Cleaned backticks (```) in categorical columns.</a:t>
             </a:r>
           </a:p>
           <a:p>

</xml_diff>